<commit_message>
Improved design doc formatting. Working on pitch powerpoint.
</commit_message>
<xml_diff>
--- a/Documents/Ocean Liner Tycoon Pitch.pptx
+++ b/Documents/Ocean Liner Tycoon Pitch.pptx
@@ -4,9 +4,14 @@
   <p:sldMasterIdLst>
     <p:sldMasterId id="2147483648" r:id="rId1"/>
   </p:sldMasterIdLst>
+  <p:notesMasterIdLst>
+    <p:notesMasterId r:id="rId6"/>
+  </p:notesMasterIdLst>
   <p:sldIdLst>
     <p:sldId id="256" r:id="rId2"/>
-    <p:sldId id="257" r:id="rId3"/>
+    <p:sldId id="258" r:id="rId3"/>
+    <p:sldId id="257" r:id="rId4"/>
+    <p:sldId id="259" r:id="rId5"/>
   </p:sldIdLst>
   <p:sldSz cx="12192000" cy="6858000"/>
   <p:notesSz cx="6858000" cy="9144000"/>
@@ -113,6 +118,440 @@
 </p:presentation>
 </file>
 
+<file path=ppt/notesMasters/notesMaster1.xml><?xml version="1.0" encoding="utf-8"?>
+<p:notesMaster xmlns:a="http://schemas.openxmlformats.org/drawingml/2006/main" xmlns:r="http://schemas.openxmlformats.org/officeDocument/2006/relationships" xmlns:p="http://schemas.openxmlformats.org/presentationml/2006/main">
+  <p:cSld>
+    <p:bg>
+      <p:bgRef idx="1001">
+        <a:schemeClr val="bg1"/>
+      </p:bgRef>
+    </p:bg>
+    <p:spTree>
+      <p:nvGrpSpPr>
+        <p:cNvPr id="1" name=""/>
+        <p:cNvGrpSpPr/>
+        <p:nvPr/>
+      </p:nvGrpSpPr>
+      <p:grpSpPr>
+        <a:xfrm>
+          <a:off x="0" y="0"/>
+          <a:ext cx="0" cy="0"/>
+          <a:chOff x="0" y="0"/>
+          <a:chExt cx="0" cy="0"/>
+        </a:xfrm>
+      </p:grpSpPr>
+      <p:sp>
+        <p:nvSpPr>
+          <p:cNvPr id="2" name="Header Placeholder 1"/>
+          <p:cNvSpPr>
+            <a:spLocks noGrp="1"/>
+          </p:cNvSpPr>
+          <p:nvPr>
+            <p:ph type="hdr" sz="quarter"/>
+          </p:nvPr>
+        </p:nvSpPr>
+        <p:spPr>
+          <a:xfrm>
+            <a:off x="0" y="0"/>
+            <a:ext cx="2971800" cy="458788"/>
+          </a:xfrm>
+          <a:prstGeom prst="rect">
+            <a:avLst/>
+          </a:prstGeom>
+        </p:spPr>
+        <p:txBody>
+          <a:bodyPr vert="horz" lIns="91440" tIns="45720" rIns="91440" bIns="45720" rtlCol="0"/>
+          <a:lstStyle>
+            <a:lvl1pPr algn="l">
+              <a:defRPr sz="1200"/>
+            </a:lvl1pPr>
+          </a:lstStyle>
+          <a:p>
+            <a:endParaRPr lang="en-GB"/>
+          </a:p>
+        </p:txBody>
+      </p:sp>
+      <p:sp>
+        <p:nvSpPr>
+          <p:cNvPr id="3" name="Date Placeholder 2"/>
+          <p:cNvSpPr>
+            <a:spLocks noGrp="1"/>
+          </p:cNvSpPr>
+          <p:nvPr>
+            <p:ph type="dt" idx="1"/>
+          </p:nvPr>
+        </p:nvSpPr>
+        <p:spPr>
+          <a:xfrm>
+            <a:off x="3884613" y="0"/>
+            <a:ext cx="2971800" cy="458788"/>
+          </a:xfrm>
+          <a:prstGeom prst="rect">
+            <a:avLst/>
+          </a:prstGeom>
+        </p:spPr>
+        <p:txBody>
+          <a:bodyPr vert="horz" lIns="91440" tIns="45720" rIns="91440" bIns="45720" rtlCol="0"/>
+          <a:lstStyle>
+            <a:lvl1pPr algn="r">
+              <a:defRPr sz="1200"/>
+            </a:lvl1pPr>
+          </a:lstStyle>
+          <a:p>
+            <a:fld id="{750B6897-353A-4628-8452-A0464FA2F485}" type="datetimeFigureOut">
+              <a:rPr lang="en-GB" smtClean="0"/>
+              <a:t>04/12/2024</a:t>
+            </a:fld>
+            <a:endParaRPr lang="en-GB"/>
+          </a:p>
+        </p:txBody>
+      </p:sp>
+      <p:sp>
+        <p:nvSpPr>
+          <p:cNvPr id="4" name="Slide Image Placeholder 3"/>
+          <p:cNvSpPr>
+            <a:spLocks noGrp="1" noRot="1" noChangeAspect="1"/>
+          </p:cNvSpPr>
+          <p:nvPr>
+            <p:ph type="sldImg" idx="2"/>
+          </p:nvPr>
+        </p:nvSpPr>
+        <p:spPr>
+          <a:xfrm>
+            <a:off x="685800" y="1143000"/>
+            <a:ext cx="5486400" cy="3086100"/>
+          </a:xfrm>
+          <a:prstGeom prst="rect">
+            <a:avLst/>
+          </a:prstGeom>
+          <a:noFill/>
+          <a:ln w="12700">
+            <a:solidFill>
+              <a:prstClr val="black"/>
+            </a:solidFill>
+          </a:ln>
+        </p:spPr>
+        <p:txBody>
+          <a:bodyPr vert="horz" lIns="91440" tIns="45720" rIns="91440" bIns="45720" rtlCol="0" anchor="ctr"/>
+          <a:lstStyle/>
+          <a:p>
+            <a:endParaRPr lang="en-GB"/>
+          </a:p>
+        </p:txBody>
+      </p:sp>
+      <p:sp>
+        <p:nvSpPr>
+          <p:cNvPr id="5" name="Notes Placeholder 4"/>
+          <p:cNvSpPr>
+            <a:spLocks noGrp="1"/>
+          </p:cNvSpPr>
+          <p:nvPr>
+            <p:ph type="body" sz="quarter" idx="3"/>
+          </p:nvPr>
+        </p:nvSpPr>
+        <p:spPr>
+          <a:xfrm>
+            <a:off x="685800" y="4400550"/>
+            <a:ext cx="5486400" cy="3600450"/>
+          </a:xfrm>
+          <a:prstGeom prst="rect">
+            <a:avLst/>
+          </a:prstGeom>
+        </p:spPr>
+        <p:txBody>
+          <a:bodyPr vert="horz" lIns="91440" tIns="45720" rIns="91440" bIns="45720" rtlCol="0"/>
+          <a:lstStyle/>
+          <a:p>
+            <a:pPr lvl="0"/>
+            <a:r>
+              <a:rPr lang="en-US"/>
+              <a:t>Click to edit Master text styles</a:t>
+            </a:r>
+          </a:p>
+          <a:p>
+            <a:pPr lvl="1"/>
+            <a:r>
+              <a:rPr lang="en-US"/>
+              <a:t>Second level</a:t>
+            </a:r>
+          </a:p>
+          <a:p>
+            <a:pPr lvl="2"/>
+            <a:r>
+              <a:rPr lang="en-US"/>
+              <a:t>Third level</a:t>
+            </a:r>
+          </a:p>
+          <a:p>
+            <a:pPr lvl="3"/>
+            <a:r>
+              <a:rPr lang="en-US"/>
+              <a:t>Fourth level</a:t>
+            </a:r>
+          </a:p>
+          <a:p>
+            <a:pPr lvl="4"/>
+            <a:r>
+              <a:rPr lang="en-US"/>
+              <a:t>Fifth level</a:t>
+            </a:r>
+            <a:endParaRPr lang="en-GB"/>
+          </a:p>
+        </p:txBody>
+      </p:sp>
+      <p:sp>
+        <p:nvSpPr>
+          <p:cNvPr id="6" name="Footer Placeholder 5"/>
+          <p:cNvSpPr>
+            <a:spLocks noGrp="1"/>
+          </p:cNvSpPr>
+          <p:nvPr>
+            <p:ph type="ftr" sz="quarter" idx="4"/>
+          </p:nvPr>
+        </p:nvSpPr>
+        <p:spPr>
+          <a:xfrm>
+            <a:off x="0" y="8685213"/>
+            <a:ext cx="2971800" cy="458787"/>
+          </a:xfrm>
+          <a:prstGeom prst="rect">
+            <a:avLst/>
+          </a:prstGeom>
+        </p:spPr>
+        <p:txBody>
+          <a:bodyPr vert="horz" lIns="91440" tIns="45720" rIns="91440" bIns="45720" rtlCol="0" anchor="b"/>
+          <a:lstStyle>
+            <a:lvl1pPr algn="l">
+              <a:defRPr sz="1200"/>
+            </a:lvl1pPr>
+          </a:lstStyle>
+          <a:p>
+            <a:endParaRPr lang="en-GB"/>
+          </a:p>
+        </p:txBody>
+      </p:sp>
+      <p:sp>
+        <p:nvSpPr>
+          <p:cNvPr id="7" name="Slide Number Placeholder 6"/>
+          <p:cNvSpPr>
+            <a:spLocks noGrp="1"/>
+          </p:cNvSpPr>
+          <p:nvPr>
+            <p:ph type="sldNum" sz="quarter" idx="5"/>
+          </p:nvPr>
+        </p:nvSpPr>
+        <p:spPr>
+          <a:xfrm>
+            <a:off x="3884613" y="8685213"/>
+            <a:ext cx="2971800" cy="458787"/>
+          </a:xfrm>
+          <a:prstGeom prst="rect">
+            <a:avLst/>
+          </a:prstGeom>
+        </p:spPr>
+        <p:txBody>
+          <a:bodyPr vert="horz" lIns="91440" tIns="45720" rIns="91440" bIns="45720" rtlCol="0" anchor="b"/>
+          <a:lstStyle>
+            <a:lvl1pPr algn="r">
+              <a:defRPr sz="1200"/>
+            </a:lvl1pPr>
+          </a:lstStyle>
+          <a:p>
+            <a:fld id="{FEB8D5C7-189C-47E3-8F0D-F8314ED2EF59}" type="slidenum">
+              <a:rPr lang="en-GB" smtClean="0"/>
+              <a:t>‹#›</a:t>
+            </a:fld>
+            <a:endParaRPr lang="en-GB"/>
+          </a:p>
+        </p:txBody>
+      </p:sp>
+    </p:spTree>
+    <p:extLst>
+      <p:ext uri="{BB962C8B-B14F-4D97-AF65-F5344CB8AC3E}">
+        <p14:creationId xmlns:p14="http://schemas.microsoft.com/office/powerpoint/2010/main" val="2218767624"/>
+      </p:ext>
+    </p:extLst>
+  </p:cSld>
+  <p:clrMap bg1="lt1" tx1="dk1" bg2="lt2" tx2="dk2" accent1="accent1" accent2="accent2" accent3="accent3" accent4="accent4" accent5="accent5" accent6="accent6" hlink="hlink" folHlink="folHlink"/>
+  <p:notesStyle>
+    <a:lvl1pPr marL="0" algn="l" defTabSz="914400" rtl="0" eaLnBrk="1" latinLnBrk="0" hangingPunct="1">
+      <a:defRPr sz="1200" kern="1200">
+        <a:solidFill>
+          <a:schemeClr val="tx1"/>
+        </a:solidFill>
+        <a:latin typeface="+mn-lt"/>
+        <a:ea typeface="+mn-ea"/>
+        <a:cs typeface="+mn-cs"/>
+      </a:defRPr>
+    </a:lvl1pPr>
+    <a:lvl2pPr marL="457200" algn="l" defTabSz="914400" rtl="0" eaLnBrk="1" latinLnBrk="0" hangingPunct="1">
+      <a:defRPr sz="1200" kern="1200">
+        <a:solidFill>
+          <a:schemeClr val="tx1"/>
+        </a:solidFill>
+        <a:latin typeface="+mn-lt"/>
+        <a:ea typeface="+mn-ea"/>
+        <a:cs typeface="+mn-cs"/>
+      </a:defRPr>
+    </a:lvl2pPr>
+    <a:lvl3pPr marL="914400" algn="l" defTabSz="914400" rtl="0" eaLnBrk="1" latinLnBrk="0" hangingPunct="1">
+      <a:defRPr sz="1200" kern="1200">
+        <a:solidFill>
+          <a:schemeClr val="tx1"/>
+        </a:solidFill>
+        <a:latin typeface="+mn-lt"/>
+        <a:ea typeface="+mn-ea"/>
+        <a:cs typeface="+mn-cs"/>
+      </a:defRPr>
+    </a:lvl3pPr>
+    <a:lvl4pPr marL="1371600" algn="l" defTabSz="914400" rtl="0" eaLnBrk="1" latinLnBrk="0" hangingPunct="1">
+      <a:defRPr sz="1200" kern="1200">
+        <a:solidFill>
+          <a:schemeClr val="tx1"/>
+        </a:solidFill>
+        <a:latin typeface="+mn-lt"/>
+        <a:ea typeface="+mn-ea"/>
+        <a:cs typeface="+mn-cs"/>
+      </a:defRPr>
+    </a:lvl4pPr>
+    <a:lvl5pPr marL="1828800" algn="l" defTabSz="914400" rtl="0" eaLnBrk="1" latinLnBrk="0" hangingPunct="1">
+      <a:defRPr sz="1200" kern="1200">
+        <a:solidFill>
+          <a:schemeClr val="tx1"/>
+        </a:solidFill>
+        <a:latin typeface="+mn-lt"/>
+        <a:ea typeface="+mn-ea"/>
+        <a:cs typeface="+mn-cs"/>
+      </a:defRPr>
+    </a:lvl5pPr>
+    <a:lvl6pPr marL="2286000" algn="l" defTabSz="914400" rtl="0" eaLnBrk="1" latinLnBrk="0" hangingPunct="1">
+      <a:defRPr sz="1200" kern="1200">
+        <a:solidFill>
+          <a:schemeClr val="tx1"/>
+        </a:solidFill>
+        <a:latin typeface="+mn-lt"/>
+        <a:ea typeface="+mn-ea"/>
+        <a:cs typeface="+mn-cs"/>
+      </a:defRPr>
+    </a:lvl6pPr>
+    <a:lvl7pPr marL="2743200" algn="l" defTabSz="914400" rtl="0" eaLnBrk="1" latinLnBrk="0" hangingPunct="1">
+      <a:defRPr sz="1200" kern="1200">
+        <a:solidFill>
+          <a:schemeClr val="tx1"/>
+        </a:solidFill>
+        <a:latin typeface="+mn-lt"/>
+        <a:ea typeface="+mn-ea"/>
+        <a:cs typeface="+mn-cs"/>
+      </a:defRPr>
+    </a:lvl7pPr>
+    <a:lvl8pPr marL="3200400" algn="l" defTabSz="914400" rtl="0" eaLnBrk="1" latinLnBrk="0" hangingPunct="1">
+      <a:defRPr sz="1200" kern="1200">
+        <a:solidFill>
+          <a:schemeClr val="tx1"/>
+        </a:solidFill>
+        <a:latin typeface="+mn-lt"/>
+        <a:ea typeface="+mn-ea"/>
+        <a:cs typeface="+mn-cs"/>
+      </a:defRPr>
+    </a:lvl8pPr>
+    <a:lvl9pPr marL="3657600" algn="l" defTabSz="914400" rtl="0" eaLnBrk="1" latinLnBrk="0" hangingPunct="1">
+      <a:defRPr sz="1200" kern="1200">
+        <a:solidFill>
+          <a:schemeClr val="tx1"/>
+        </a:solidFill>
+        <a:latin typeface="+mn-lt"/>
+        <a:ea typeface="+mn-ea"/>
+        <a:cs typeface="+mn-cs"/>
+      </a:defRPr>
+    </a:lvl9pPr>
+  </p:notesStyle>
+</p:notesMaster>
+</file>
+
+<file path=ppt/notesSlides/notesSlide1.xml><?xml version="1.0" encoding="utf-8"?>
+<p:notes xmlns:a="http://schemas.openxmlformats.org/drawingml/2006/main" xmlns:r="http://schemas.openxmlformats.org/officeDocument/2006/relationships" xmlns:p="http://schemas.openxmlformats.org/presentationml/2006/main">
+  <p:cSld>
+    <p:spTree>
+      <p:nvGrpSpPr>
+        <p:cNvPr id="1" name=""/>
+        <p:cNvGrpSpPr/>
+        <p:nvPr/>
+      </p:nvGrpSpPr>
+      <p:grpSpPr>
+        <a:xfrm>
+          <a:off x="0" y="0"/>
+          <a:ext cx="0" cy="0"/>
+          <a:chOff x="0" y="0"/>
+          <a:chExt cx="0" cy="0"/>
+        </a:xfrm>
+      </p:grpSpPr>
+      <p:sp>
+        <p:nvSpPr>
+          <p:cNvPr id="2" name="Slide Image Placeholder 1"/>
+          <p:cNvSpPr>
+            <a:spLocks noGrp="1" noRot="1" noChangeAspect="1"/>
+          </p:cNvSpPr>
+          <p:nvPr>
+            <p:ph type="sldImg"/>
+          </p:nvPr>
+        </p:nvSpPr>
+        <p:spPr/>
+      </p:sp>
+      <p:sp>
+        <p:nvSpPr>
+          <p:cNvPr id="3" name="Notes Placeholder 2"/>
+          <p:cNvSpPr>
+            <a:spLocks noGrp="1"/>
+          </p:cNvSpPr>
+          <p:nvPr>
+            <p:ph type="body" idx="1"/>
+          </p:nvPr>
+        </p:nvSpPr>
+        <p:spPr/>
+        <p:txBody>
+          <a:bodyPr/>
+          <a:lstStyle/>
+          <a:p>
+            <a:endParaRPr lang="en-GB" dirty="0"/>
+          </a:p>
+        </p:txBody>
+      </p:sp>
+      <p:sp>
+        <p:nvSpPr>
+          <p:cNvPr id="4" name="Slide Number Placeholder 3"/>
+          <p:cNvSpPr>
+            <a:spLocks noGrp="1"/>
+          </p:cNvSpPr>
+          <p:nvPr>
+            <p:ph type="sldNum" sz="quarter" idx="5"/>
+          </p:nvPr>
+        </p:nvSpPr>
+        <p:spPr/>
+        <p:txBody>
+          <a:bodyPr/>
+          <a:lstStyle/>
+          <a:p>
+            <a:fld id="{FEB8D5C7-189C-47E3-8F0D-F8314ED2EF59}" type="slidenum">
+              <a:rPr lang="en-GB" smtClean="0"/>
+              <a:t>2</a:t>
+            </a:fld>
+            <a:endParaRPr lang="en-GB"/>
+          </a:p>
+        </p:txBody>
+      </p:sp>
+    </p:spTree>
+    <p:extLst>
+      <p:ext uri="{BB962C8B-B14F-4D97-AF65-F5344CB8AC3E}">
+        <p14:creationId xmlns:p14="http://schemas.microsoft.com/office/powerpoint/2010/main" val="994900655"/>
+      </p:ext>
+    </p:extLst>
+  </p:cSld>
+  <p:clrMapOvr>
+    <a:masterClrMapping/>
+  </p:clrMapOvr>
+</p:notes>
+</file>
+
 <file path=ppt/slideLayouts/slideLayout1.xml><?xml version="1.0" encoding="utf-8"?>
 <p:sldLayout xmlns:a="http://schemas.openxmlformats.org/drawingml/2006/main" xmlns:r="http://schemas.openxmlformats.org/officeDocument/2006/relationships" xmlns:p="http://schemas.openxmlformats.org/presentationml/2006/main" type="title" preserve="1">
   <p:cSld name="Title Slide">
@@ -262,7 +701,7 @@
           <a:p>
             <a:fld id="{E5A78C10-9715-4B66-95E6-A8C7765510FF}" type="datetimeFigureOut">
               <a:rPr lang="en-GB" smtClean="0"/>
-              <a:t>28/11/2024</a:t>
+              <a:t>04/12/2024</a:t>
             </a:fld>
             <a:endParaRPr lang="en-GB"/>
           </a:p>
@@ -462,7 +901,7 @@
           <a:p>
             <a:fld id="{E5A78C10-9715-4B66-95E6-A8C7765510FF}" type="datetimeFigureOut">
               <a:rPr lang="en-GB" smtClean="0"/>
-              <a:t>28/11/2024</a:t>
+              <a:t>04/12/2024</a:t>
             </a:fld>
             <a:endParaRPr lang="en-GB"/>
           </a:p>
@@ -672,7 +1111,7 @@
           <a:p>
             <a:fld id="{E5A78C10-9715-4B66-95E6-A8C7765510FF}" type="datetimeFigureOut">
               <a:rPr lang="en-GB" smtClean="0"/>
-              <a:t>28/11/2024</a:t>
+              <a:t>04/12/2024</a:t>
             </a:fld>
             <a:endParaRPr lang="en-GB"/>
           </a:p>
@@ -872,7 +1311,7 @@
           <a:p>
             <a:fld id="{E5A78C10-9715-4B66-95E6-A8C7765510FF}" type="datetimeFigureOut">
               <a:rPr lang="en-GB" smtClean="0"/>
-              <a:t>28/11/2024</a:t>
+              <a:t>04/12/2024</a:t>
             </a:fld>
             <a:endParaRPr lang="en-GB"/>
           </a:p>
@@ -1148,7 +1587,7 @@
           <a:p>
             <a:fld id="{E5A78C10-9715-4B66-95E6-A8C7765510FF}" type="datetimeFigureOut">
               <a:rPr lang="en-GB" smtClean="0"/>
-              <a:t>28/11/2024</a:t>
+              <a:t>04/12/2024</a:t>
             </a:fld>
             <a:endParaRPr lang="en-GB"/>
           </a:p>
@@ -1416,7 +1855,7 @@
           <a:p>
             <a:fld id="{E5A78C10-9715-4B66-95E6-A8C7765510FF}" type="datetimeFigureOut">
               <a:rPr lang="en-GB" smtClean="0"/>
-              <a:t>28/11/2024</a:t>
+              <a:t>04/12/2024</a:t>
             </a:fld>
             <a:endParaRPr lang="en-GB"/>
           </a:p>
@@ -1831,7 +2270,7 @@
           <a:p>
             <a:fld id="{E5A78C10-9715-4B66-95E6-A8C7765510FF}" type="datetimeFigureOut">
               <a:rPr lang="en-GB" smtClean="0"/>
-              <a:t>28/11/2024</a:t>
+              <a:t>04/12/2024</a:t>
             </a:fld>
             <a:endParaRPr lang="en-GB"/>
           </a:p>
@@ -1973,7 +2412,7 @@
           <a:p>
             <a:fld id="{E5A78C10-9715-4B66-95E6-A8C7765510FF}" type="datetimeFigureOut">
               <a:rPr lang="en-GB" smtClean="0"/>
-              <a:t>28/11/2024</a:t>
+              <a:t>04/12/2024</a:t>
             </a:fld>
             <a:endParaRPr lang="en-GB"/>
           </a:p>
@@ -2086,7 +2525,7 @@
           <a:p>
             <a:fld id="{E5A78C10-9715-4B66-95E6-A8C7765510FF}" type="datetimeFigureOut">
               <a:rPr lang="en-GB" smtClean="0"/>
-              <a:t>28/11/2024</a:t>
+              <a:t>04/12/2024</a:t>
             </a:fld>
             <a:endParaRPr lang="en-GB"/>
           </a:p>
@@ -2399,7 +2838,7 @@
           <a:p>
             <a:fld id="{E5A78C10-9715-4B66-95E6-A8C7765510FF}" type="datetimeFigureOut">
               <a:rPr lang="en-GB" smtClean="0"/>
-              <a:t>28/11/2024</a:t>
+              <a:t>04/12/2024</a:t>
             </a:fld>
             <a:endParaRPr lang="en-GB"/>
           </a:p>
@@ -2688,7 +3127,7 @@
           <a:p>
             <a:fld id="{E5A78C10-9715-4B66-95E6-A8C7765510FF}" type="datetimeFigureOut">
               <a:rPr lang="en-GB" smtClean="0"/>
-              <a:t>28/11/2024</a:t>
+              <a:t>04/12/2024</a:t>
             </a:fld>
             <a:endParaRPr lang="en-GB"/>
           </a:p>
@@ -2931,7 +3370,7 @@
           <a:p>
             <a:fld id="{E5A78C10-9715-4B66-95E6-A8C7765510FF}" type="datetimeFigureOut">
               <a:rPr lang="en-GB" smtClean="0"/>
-              <a:t>28/11/2024</a:t>
+              <a:t>04/12/2024</a:t>
             </a:fld>
             <a:endParaRPr lang="en-GB"/>
           </a:p>
@@ -3439,7 +3878,7 @@
           <p:cNvPr id="2" name="Title 1">
             <a:extLst>
               <a:ext uri="{FF2B5EF4-FFF2-40B4-BE49-F238E27FC236}">
-                <a16:creationId xmlns:a16="http://schemas.microsoft.com/office/drawing/2014/main" id="{12884ABD-DFD3-9EAA-86BD-5079D539BE37}"/>
+                <a16:creationId xmlns:a16="http://schemas.microsoft.com/office/drawing/2014/main" id="{C557E7D8-6E82-C41A-3F4A-F2F0354D4500}"/>
               </a:ext>
             </a:extLst>
           </p:cNvPr>
@@ -3457,7 +3896,7 @@
           <a:p>
             <a:r>
               <a:rPr lang="en-GB" dirty="0"/>
-              <a:t>Ocean Liner Tycoon</a:t>
+              <a:t>What is Ocean Liner Tycoon?</a:t>
             </a:r>
           </a:p>
         </p:txBody>
@@ -3467,7 +3906,7 @@
           <p:cNvPr id="3" name="Content Placeholder 2">
             <a:extLst>
               <a:ext uri="{FF2B5EF4-FFF2-40B4-BE49-F238E27FC236}">
-                <a16:creationId xmlns:a16="http://schemas.microsoft.com/office/drawing/2014/main" id="{117DF4A5-3FBE-6B68-0598-AD5EBC31274D}"/>
+                <a16:creationId xmlns:a16="http://schemas.microsoft.com/office/drawing/2014/main" id="{61AA5EC9-08B0-4096-7C75-79F701A58371}"/>
               </a:ext>
             </a:extLst>
           </p:cNvPr>
@@ -3483,41 +3922,51 @@
           <a:bodyPr/>
           <a:lstStyle/>
           <a:p>
+            <a:pPr marL="0" indent="0" algn="ctr">
+              <a:buNone/>
+            </a:pPr>
             <a:r>
               <a:rPr lang="en-GB" dirty="0"/>
-              <a:t>A mobile tycoon game focusing on the era of ocean liner travel</a:t>
-            </a:r>
-          </a:p>
-          <a:p>
+              <a:t>A mobile tycoon game</a:t>
+            </a:r>
+          </a:p>
+          <a:p>
+            <a:pPr marL="0" indent="0" algn="ctr">
+              <a:buNone/>
+            </a:pPr>
+            <a:endParaRPr lang="en-GB" dirty="0"/>
+          </a:p>
+          <a:p>
+            <a:pPr marL="0" indent="0" algn="ctr">
+              <a:buNone/>
+            </a:pPr>
             <a:r>
               <a:rPr lang="en-GB" dirty="0"/>
-              <a:t>Players grow their fleet of ocean </a:t>
-            </a:r>
-            <a:r>
-              <a:rPr lang="en-GB"/>
-              <a:t>liner ships</a:t>
-            </a:r>
-            <a:endParaRPr lang="en-GB" dirty="0"/>
+              <a:t>This genre is very popular</a:t>
+            </a:r>
+            <a:endParaRPr lang="en-GB" dirty="0">
+              <a:latin typeface="Britannic Bold" panose="020B0903060703020204" pitchFamily="34" charset="0"/>
+            </a:endParaRPr>
           </a:p>
         </p:txBody>
       </p:sp>
     </p:spTree>
     <p:extLst>
       <p:ext uri="{BB962C8B-B14F-4D97-AF65-F5344CB8AC3E}">
-        <p14:creationId xmlns:p14="http://schemas.microsoft.com/office/powerpoint/2010/main" val="3530049471"/>
+        <p14:creationId xmlns:p14="http://schemas.microsoft.com/office/powerpoint/2010/main" val="1879586823"/>
       </p:ext>
     </p:extLst>
   </p:cSld>
   <p:clrMapOvr>
     <a:masterClrMapping/>
   </p:clrMapOvr>
-  <mc:AlternateContent xmlns:mc="http://schemas.openxmlformats.org/markup-compatibility/2006" xmlns:p14="http://schemas.microsoft.com/office/powerpoint/2010/main">
-    <mc:Choice Requires="p14">
-      <p:transition spd="slow" p14:dur="1250">
-        <p14:switch dir="r"/>
+  <mc:AlternateContent xmlns:mc="http://schemas.openxmlformats.org/markup-compatibility/2006">
+    <mc:Choice xmlns:p14="http://schemas.microsoft.com/office/powerpoint/2010/main" Requires="p14">
+      <p:transition spd="slow" p14:dur="3400">
+        <p14:reveal/>
       </p:transition>
     </mc:Choice>
-    <mc:Fallback xmlns="">
+    <mc:Fallback>
       <p:transition spd="slow">
         <p:fade/>
       </p:transition>
@@ -3544,7 +3993,7 @@
                             </p:stCondLst>
                             <p:childTnLst>
                               <p:par>
-                                <p:cTn id="5" presetID="2" presetClass="entr" presetSubtype="8" fill="hold" grpId="0" nodeType="clickEffect">
+                                <p:cTn id="5" presetID="10" presetClass="entr" presetSubtype="0" fill="hold" grpId="0" nodeType="clickEffect">
                                   <p:stCondLst>
                                     <p:cond delay="0"/>
                                   </p:stCondLst>
@@ -3571,9 +4020,9 @@
                                         <p:strVal val="visible"/>
                                       </p:to>
                                     </p:set>
-                                    <p:anim calcmode="lin" valueType="num">
-                                      <p:cBhvr additive="base">
-                                        <p:cTn id="7" dur="500" fill="hold"/>
+                                    <p:animEffect transition="in" filter="fade">
+                                      <p:cBhvr>
+                                        <p:cTn id="7" dur="500"/>
                                         <p:tgtEl>
                                           <p:spTgt spid="3">
                                             <p:txEl>
@@ -3581,50 +4030,8 @@
                                             </p:txEl>
                                           </p:spTgt>
                                         </p:tgtEl>
-                                        <p:attrNameLst>
-                                          <p:attrName>ppt_x</p:attrName>
-                                        </p:attrNameLst>
                                       </p:cBhvr>
-                                      <p:tavLst>
-                                        <p:tav tm="0">
-                                          <p:val>
-                                            <p:strVal val="0-#ppt_w/2"/>
-                                          </p:val>
-                                        </p:tav>
-                                        <p:tav tm="100000">
-                                          <p:val>
-                                            <p:strVal val="#ppt_x"/>
-                                          </p:val>
-                                        </p:tav>
-                                      </p:tavLst>
-                                    </p:anim>
-                                    <p:anim calcmode="lin" valueType="num">
-                                      <p:cBhvr additive="base">
-                                        <p:cTn id="8" dur="500" fill="hold"/>
-                                        <p:tgtEl>
-                                          <p:spTgt spid="3">
-                                            <p:txEl>
-                                              <p:pRg st="0" end="0"/>
-                                            </p:txEl>
-                                          </p:spTgt>
-                                        </p:tgtEl>
-                                        <p:attrNameLst>
-                                          <p:attrName>ppt_y</p:attrName>
-                                        </p:attrNameLst>
-                                      </p:cBhvr>
-                                      <p:tavLst>
-                                        <p:tav tm="0">
-                                          <p:val>
-                                            <p:strVal val="#ppt_y"/>
-                                          </p:val>
-                                        </p:tav>
-                                        <p:tav tm="100000">
-                                          <p:val>
-                                            <p:strVal val="#ppt_y"/>
-                                          </p:val>
-                                        </p:tav>
-                                      </p:tavLst>
-                                    </p:anim>
+                                    </p:animEffect>
                                   </p:childTnLst>
                                 </p:cTn>
                               </p:par>
@@ -3635,26 +4042,26 @@
                     </p:cTn>
                   </p:par>
                   <p:par>
-                    <p:cTn id="9" fill="hold">
+                    <p:cTn id="8" fill="hold">
                       <p:stCondLst>
                         <p:cond delay="indefinite"/>
                       </p:stCondLst>
                       <p:childTnLst>
                         <p:par>
-                          <p:cTn id="10" fill="hold">
+                          <p:cTn id="9" fill="hold">
                             <p:stCondLst>
                               <p:cond delay="0"/>
                             </p:stCondLst>
                             <p:childTnLst>
                               <p:par>
-                                <p:cTn id="11" presetID="2" presetClass="entr" presetSubtype="8" fill="hold" grpId="0" nodeType="clickEffect">
+                                <p:cTn id="10" presetID="10" presetClass="entr" presetSubtype="0" fill="hold" grpId="0" nodeType="clickEffect">
                                   <p:stCondLst>
                                     <p:cond delay="0"/>
                                   </p:stCondLst>
                                   <p:childTnLst>
                                     <p:set>
                                       <p:cBhvr>
-                                        <p:cTn id="12" dur="1" fill="hold">
+                                        <p:cTn id="11" dur="1" fill="hold">
                                           <p:stCondLst>
                                             <p:cond delay="0"/>
                                           </p:stCondLst>
@@ -3662,7 +4069,7 @@
                                         <p:tgtEl>
                                           <p:spTgt spid="3">
                                             <p:txEl>
-                                              <p:pRg st="1" end="1"/>
+                                              <p:pRg st="2" end="2"/>
                                             </p:txEl>
                                           </p:spTgt>
                                         </p:tgtEl>
@@ -3674,60 +4081,636 @@
                                         <p:strVal val="visible"/>
                                       </p:to>
                                     </p:set>
-                                    <p:anim calcmode="lin" valueType="num">
-                                      <p:cBhvr additive="base">
-                                        <p:cTn id="13" dur="500" fill="hold"/>
+                                    <p:animEffect transition="in" filter="fade">
+                                      <p:cBhvr>
+                                        <p:cTn id="12" dur="500"/>
                                         <p:tgtEl>
                                           <p:spTgt spid="3">
                                             <p:txEl>
-                                              <p:pRg st="1" end="1"/>
+                                              <p:pRg st="2" end="2"/>
+                                            </p:txEl>
+                                          </p:spTgt>
+                                        </p:tgtEl>
+                                      </p:cBhvr>
+                                    </p:animEffect>
+                                  </p:childTnLst>
+                                </p:cTn>
+                              </p:par>
+                            </p:childTnLst>
+                          </p:cTn>
+                        </p:par>
+                      </p:childTnLst>
+                    </p:cTn>
+                  </p:par>
+                </p:childTnLst>
+              </p:cTn>
+              <p:prevCondLst>
+                <p:cond evt="onPrev" delay="0">
+                  <p:tgtEl>
+                    <p:sldTgt/>
+                  </p:tgtEl>
+                </p:cond>
+              </p:prevCondLst>
+              <p:nextCondLst>
+                <p:cond evt="onNext" delay="0">
+                  <p:tgtEl>
+                    <p:sldTgt/>
+                  </p:tgtEl>
+                </p:cond>
+              </p:nextCondLst>
+            </p:seq>
+          </p:childTnLst>
+        </p:cTn>
+      </p:par>
+    </p:tnLst>
+    <p:bldLst>
+      <p:bldP spid="3" grpId="0" uiExpand="1" build="p"/>
+    </p:bldLst>
+  </p:timing>
+</p:sld>
+</file>
+
+<file path=ppt/slides/slide3.xml><?xml version="1.0" encoding="utf-8"?>
+<p:sld xmlns:a="http://schemas.openxmlformats.org/drawingml/2006/main" xmlns:r="http://schemas.openxmlformats.org/officeDocument/2006/relationships" xmlns:p="http://schemas.openxmlformats.org/presentationml/2006/main">
+  <p:cSld>
+    <p:spTree>
+      <p:nvGrpSpPr>
+        <p:cNvPr id="1" name=""/>
+        <p:cNvGrpSpPr/>
+        <p:nvPr/>
+      </p:nvGrpSpPr>
+      <p:grpSpPr>
+        <a:xfrm>
+          <a:off x="0" y="0"/>
+          <a:ext cx="0" cy="0"/>
+          <a:chOff x="0" y="0"/>
+          <a:chExt cx="0" cy="0"/>
+        </a:xfrm>
+      </p:grpSpPr>
+      <p:sp>
+        <p:nvSpPr>
+          <p:cNvPr id="2" name="Title 1">
+            <a:extLst>
+              <a:ext uri="{FF2B5EF4-FFF2-40B4-BE49-F238E27FC236}">
+                <a16:creationId xmlns:a16="http://schemas.microsoft.com/office/drawing/2014/main" id="{12884ABD-DFD3-9EAA-86BD-5079D539BE37}"/>
+              </a:ext>
+            </a:extLst>
+          </p:cNvPr>
+          <p:cNvSpPr>
+            <a:spLocks noGrp="1"/>
+          </p:cNvSpPr>
+          <p:nvPr>
+            <p:ph type="title"/>
+          </p:nvPr>
+        </p:nvSpPr>
+        <p:spPr/>
+        <p:txBody>
+          <a:bodyPr/>
+          <a:lstStyle/>
+          <a:p>
+            <a:r>
+              <a:rPr lang="en-GB" dirty="0"/>
+              <a:t>What is Ocean Liner Tycoon?</a:t>
+            </a:r>
+          </a:p>
+        </p:txBody>
+      </p:sp>
+      <p:sp>
+        <p:nvSpPr>
+          <p:cNvPr id="3" name="Content Placeholder 2">
+            <a:extLst>
+              <a:ext uri="{FF2B5EF4-FFF2-40B4-BE49-F238E27FC236}">
+                <a16:creationId xmlns:a16="http://schemas.microsoft.com/office/drawing/2014/main" id="{117DF4A5-3FBE-6B68-0598-AD5EBC31274D}"/>
+              </a:ext>
+            </a:extLst>
+          </p:cNvPr>
+          <p:cNvSpPr>
+            <a:spLocks noGrp="1"/>
+          </p:cNvSpPr>
+          <p:nvPr>
+            <p:ph idx="1"/>
+          </p:nvPr>
+        </p:nvSpPr>
+        <p:spPr/>
+        <p:txBody>
+          <a:bodyPr/>
+          <a:lstStyle/>
+          <a:p>
+            <a:pPr marL="0" indent="0" algn="ctr">
+              <a:buNone/>
+            </a:pPr>
+            <a:r>
+              <a:rPr lang="en-GB" dirty="0"/>
+              <a:t>The era of ocean liner travel</a:t>
+            </a:r>
+          </a:p>
+          <a:p>
+            <a:pPr marL="0" indent="0" algn="ctr">
+              <a:buNone/>
+            </a:pPr>
+            <a:endParaRPr lang="en-GB" dirty="0"/>
+          </a:p>
+          <a:p>
+            <a:pPr marL="0" indent="0" algn="ctr">
+              <a:buNone/>
+            </a:pPr>
+            <a:r>
+              <a:rPr lang="en-GB" dirty="0"/>
+              <a:t>The RMS Titanic is iconic</a:t>
+            </a:r>
+          </a:p>
+        </p:txBody>
+      </p:sp>
+    </p:spTree>
+    <p:extLst>
+      <p:ext uri="{BB962C8B-B14F-4D97-AF65-F5344CB8AC3E}">
+        <p14:creationId xmlns:p14="http://schemas.microsoft.com/office/powerpoint/2010/main" val="3530049471"/>
+      </p:ext>
+    </p:extLst>
+  </p:cSld>
+  <p:clrMapOvr>
+    <a:masterClrMapping/>
+  </p:clrMapOvr>
+  <mc:AlternateContent xmlns:mc="http://schemas.openxmlformats.org/markup-compatibility/2006">
+    <mc:Choice xmlns:p14="http://schemas.microsoft.com/office/powerpoint/2010/main" Requires="p14">
+      <p:transition spd="med" p14:dur="700">
+        <p:fade/>
+      </p:transition>
+    </mc:Choice>
+    <mc:Fallback>
+      <p:transition spd="med">
+        <p:fade/>
+      </p:transition>
+    </mc:Fallback>
+  </mc:AlternateContent>
+  <p:timing>
+    <p:tnLst>
+      <p:par>
+        <p:cTn id="1" dur="indefinite" restart="never" nodeType="tmRoot">
+          <p:childTnLst>
+            <p:seq concurrent="1" nextAc="seek">
+              <p:cTn id="2" dur="indefinite" nodeType="mainSeq">
+                <p:childTnLst>
+                  <p:par>
+                    <p:cTn id="3" fill="hold">
+                      <p:stCondLst>
+                        <p:cond delay="indefinite"/>
+                      </p:stCondLst>
+                      <p:childTnLst>
+                        <p:par>
+                          <p:cTn id="4" fill="hold">
+                            <p:stCondLst>
+                              <p:cond delay="0"/>
+                            </p:stCondLst>
+                            <p:childTnLst>
+                              <p:par>
+                                <p:cTn id="5" presetID="10" presetClass="entr" presetSubtype="0" fill="hold" grpId="0" nodeType="clickEffect">
+                                  <p:stCondLst>
+                                    <p:cond delay="0"/>
+                                  </p:stCondLst>
+                                  <p:childTnLst>
+                                    <p:set>
+                                      <p:cBhvr>
+                                        <p:cTn id="6" dur="1" fill="hold">
+                                          <p:stCondLst>
+                                            <p:cond delay="0"/>
+                                          </p:stCondLst>
+                                        </p:cTn>
+                                        <p:tgtEl>
+                                          <p:spTgt spid="3">
+                                            <p:txEl>
+                                              <p:pRg st="0" end="0"/>
                                             </p:txEl>
                                           </p:spTgt>
                                         </p:tgtEl>
                                         <p:attrNameLst>
-                                          <p:attrName>ppt_x</p:attrName>
+                                          <p:attrName>style.visibility</p:attrName>
                                         </p:attrNameLst>
                                       </p:cBhvr>
-                                      <p:tavLst>
-                                        <p:tav tm="0">
-                                          <p:val>
-                                            <p:strVal val="0-#ppt_w/2"/>
-                                          </p:val>
-                                        </p:tav>
-                                        <p:tav tm="100000">
-                                          <p:val>
-                                            <p:strVal val="#ppt_x"/>
-                                          </p:val>
-                                        </p:tav>
-                                      </p:tavLst>
-                                    </p:anim>
-                                    <p:anim calcmode="lin" valueType="num">
-                                      <p:cBhvr additive="base">
-                                        <p:cTn id="14" dur="500" fill="hold"/>
+                                      <p:to>
+                                        <p:strVal val="visible"/>
+                                      </p:to>
+                                    </p:set>
+                                    <p:animEffect transition="in" filter="fade">
+                                      <p:cBhvr>
+                                        <p:cTn id="7" dur="500"/>
                                         <p:tgtEl>
                                           <p:spTgt spid="3">
                                             <p:txEl>
-                                              <p:pRg st="1" end="1"/>
+                                              <p:pRg st="0" end="0"/>
+                                            </p:txEl>
+                                          </p:spTgt>
+                                        </p:tgtEl>
+                                      </p:cBhvr>
+                                    </p:animEffect>
+                                  </p:childTnLst>
+                                </p:cTn>
+                              </p:par>
+                            </p:childTnLst>
+                          </p:cTn>
+                        </p:par>
+                      </p:childTnLst>
+                    </p:cTn>
+                  </p:par>
+                  <p:par>
+                    <p:cTn id="8" fill="hold">
+                      <p:stCondLst>
+                        <p:cond delay="indefinite"/>
+                      </p:stCondLst>
+                      <p:childTnLst>
+                        <p:par>
+                          <p:cTn id="9" fill="hold">
+                            <p:stCondLst>
+                              <p:cond delay="0"/>
+                            </p:stCondLst>
+                            <p:childTnLst>
+                              <p:par>
+                                <p:cTn id="10" presetID="10" presetClass="entr" presetSubtype="0" fill="hold" grpId="0" nodeType="clickEffect">
+                                  <p:stCondLst>
+                                    <p:cond delay="0"/>
+                                  </p:stCondLst>
+                                  <p:childTnLst>
+                                    <p:set>
+                                      <p:cBhvr>
+                                        <p:cTn id="11" dur="1" fill="hold">
+                                          <p:stCondLst>
+                                            <p:cond delay="0"/>
+                                          </p:stCondLst>
+                                        </p:cTn>
+                                        <p:tgtEl>
+                                          <p:spTgt spid="3">
+                                            <p:txEl>
+                                              <p:pRg st="2" end="2"/>
                                             </p:txEl>
                                           </p:spTgt>
                                         </p:tgtEl>
                                         <p:attrNameLst>
-                                          <p:attrName>ppt_y</p:attrName>
+                                          <p:attrName>style.visibility</p:attrName>
                                         </p:attrNameLst>
                                       </p:cBhvr>
-                                      <p:tavLst>
-                                        <p:tav tm="0">
-                                          <p:val>
-                                            <p:strVal val="#ppt_y"/>
-                                          </p:val>
-                                        </p:tav>
-                                        <p:tav tm="100000">
-                                          <p:val>
-                                            <p:strVal val="#ppt_y"/>
-                                          </p:val>
-                                        </p:tav>
-                                      </p:tavLst>
-                                    </p:anim>
+                                      <p:to>
+                                        <p:strVal val="visible"/>
+                                      </p:to>
+                                    </p:set>
+                                    <p:animEffect transition="in" filter="fade">
+                                      <p:cBhvr>
+                                        <p:cTn id="12" dur="500"/>
+                                        <p:tgtEl>
+                                          <p:spTgt spid="3">
+                                            <p:txEl>
+                                              <p:pRg st="2" end="2"/>
+                                            </p:txEl>
+                                          </p:spTgt>
+                                        </p:tgtEl>
+                                      </p:cBhvr>
+                                    </p:animEffect>
+                                  </p:childTnLst>
+                                </p:cTn>
+                              </p:par>
+                            </p:childTnLst>
+                          </p:cTn>
+                        </p:par>
+                      </p:childTnLst>
+                    </p:cTn>
+                  </p:par>
+                </p:childTnLst>
+              </p:cTn>
+              <p:prevCondLst>
+                <p:cond evt="onPrev" delay="0">
+                  <p:tgtEl>
+                    <p:sldTgt/>
+                  </p:tgtEl>
+                </p:cond>
+              </p:prevCondLst>
+              <p:nextCondLst>
+                <p:cond evt="onNext" delay="0">
+                  <p:tgtEl>
+                    <p:sldTgt/>
+                  </p:tgtEl>
+                </p:cond>
+              </p:nextCondLst>
+            </p:seq>
+          </p:childTnLst>
+        </p:cTn>
+      </p:par>
+    </p:tnLst>
+    <p:bldLst>
+      <p:bldP spid="3" grpId="0" uiExpand="1" build="p"/>
+    </p:bldLst>
+  </p:timing>
+</p:sld>
+</file>
+
+<file path=ppt/slides/slide4.xml><?xml version="1.0" encoding="utf-8"?>
+<p:sld xmlns:a="http://schemas.openxmlformats.org/drawingml/2006/main" xmlns:r="http://schemas.openxmlformats.org/officeDocument/2006/relationships" xmlns:p="http://schemas.openxmlformats.org/presentationml/2006/main">
+  <p:cSld>
+    <p:spTree>
+      <p:nvGrpSpPr>
+        <p:cNvPr id="1" name=""/>
+        <p:cNvGrpSpPr/>
+        <p:nvPr/>
+      </p:nvGrpSpPr>
+      <p:grpSpPr>
+        <a:xfrm>
+          <a:off x="0" y="0"/>
+          <a:ext cx="0" cy="0"/>
+          <a:chOff x="0" y="0"/>
+          <a:chExt cx="0" cy="0"/>
+        </a:xfrm>
+      </p:grpSpPr>
+      <p:sp>
+        <p:nvSpPr>
+          <p:cNvPr id="2" name="Title 1">
+            <a:extLst>
+              <a:ext uri="{FF2B5EF4-FFF2-40B4-BE49-F238E27FC236}">
+                <a16:creationId xmlns:a16="http://schemas.microsoft.com/office/drawing/2014/main" id="{CA70B78C-FED0-84DE-349F-7A7A2851646A}"/>
+              </a:ext>
+            </a:extLst>
+          </p:cNvPr>
+          <p:cNvSpPr>
+            <a:spLocks noGrp="1"/>
+          </p:cNvSpPr>
+          <p:nvPr>
+            <p:ph type="title"/>
+          </p:nvPr>
+        </p:nvSpPr>
+        <p:spPr/>
+        <p:txBody>
+          <a:bodyPr/>
+          <a:lstStyle/>
+          <a:p>
+            <a:r>
+              <a:rPr lang="en-GB" dirty="0"/>
+              <a:t>Who is the Target Audience?</a:t>
+            </a:r>
+          </a:p>
+        </p:txBody>
+      </p:sp>
+      <p:sp>
+        <p:nvSpPr>
+          <p:cNvPr id="3" name="Content Placeholder 2">
+            <a:extLst>
+              <a:ext uri="{FF2B5EF4-FFF2-40B4-BE49-F238E27FC236}">
+                <a16:creationId xmlns:a16="http://schemas.microsoft.com/office/drawing/2014/main" id="{B76DD722-430B-3798-7EA6-FE6231F487B8}"/>
+              </a:ext>
+            </a:extLst>
+          </p:cNvPr>
+          <p:cNvSpPr>
+            <a:spLocks noGrp="1"/>
+          </p:cNvSpPr>
+          <p:nvPr>
+            <p:ph idx="1"/>
+          </p:nvPr>
+        </p:nvSpPr>
+        <p:spPr/>
+        <p:txBody>
+          <a:bodyPr/>
+          <a:lstStyle/>
+          <a:p>
+            <a:pPr marL="0" indent="0" algn="ctr">
+              <a:buNone/>
+            </a:pPr>
+            <a:r>
+              <a:rPr lang="en-GB" dirty="0"/>
+              <a:t>Two audiences:</a:t>
+            </a:r>
+          </a:p>
+          <a:p>
+            <a:pPr marL="0" indent="0" algn="ctr">
+              <a:buNone/>
+            </a:pPr>
+            <a:endParaRPr lang="en-GB" dirty="0"/>
+          </a:p>
+          <a:p>
+            <a:pPr marL="0" indent="0" algn="ctr">
+              <a:buNone/>
+            </a:pPr>
+            <a:r>
+              <a:rPr lang="en-GB" dirty="0"/>
+              <a:t>People with an interest in maritime history</a:t>
+            </a:r>
+          </a:p>
+          <a:p>
+            <a:pPr marL="0" indent="0" algn="ctr">
+              <a:buNone/>
+            </a:pPr>
+            <a:endParaRPr lang="en-GB" dirty="0"/>
+          </a:p>
+          <a:p>
+            <a:pPr marL="0" indent="0" algn="ctr">
+              <a:buNone/>
+            </a:pPr>
+            <a:r>
+              <a:rPr lang="en-GB" dirty="0"/>
+              <a:t>A wider audience from the prevalence of the Titanic in pop culture</a:t>
+            </a:r>
+          </a:p>
+        </p:txBody>
+      </p:sp>
+    </p:spTree>
+    <p:extLst>
+      <p:ext uri="{BB962C8B-B14F-4D97-AF65-F5344CB8AC3E}">
+        <p14:creationId xmlns:p14="http://schemas.microsoft.com/office/powerpoint/2010/main" val="1852300894"/>
+      </p:ext>
+    </p:extLst>
+  </p:cSld>
+  <p:clrMapOvr>
+    <a:masterClrMapping/>
+  </p:clrMapOvr>
+  <mc:AlternateContent xmlns:mc="http://schemas.openxmlformats.org/markup-compatibility/2006">
+    <mc:Choice xmlns:p15="http://schemas.microsoft.com/office/powerpoint/2012/main" Requires="p15">
+      <p:transition xmlns:p14="http://schemas.microsoft.com/office/powerpoint/2010/main" spd="slow" p14:dur="2000">
+        <p15:prstTrans prst="fracture"/>
+      </p:transition>
+    </mc:Choice>
+    <mc:Fallback>
+      <p:transition spd="slow">
+        <p:fade/>
+      </p:transition>
+    </mc:Fallback>
+  </mc:AlternateContent>
+  <p:timing>
+    <p:tnLst>
+      <p:par>
+        <p:cTn id="1" dur="indefinite" restart="never" nodeType="tmRoot">
+          <p:childTnLst>
+            <p:seq concurrent="1" nextAc="seek">
+              <p:cTn id="2" dur="indefinite" nodeType="mainSeq">
+                <p:childTnLst>
+                  <p:par>
+                    <p:cTn id="3" fill="hold">
+                      <p:stCondLst>
+                        <p:cond delay="indefinite"/>
+                      </p:stCondLst>
+                      <p:childTnLst>
+                        <p:par>
+                          <p:cTn id="4" fill="hold">
+                            <p:stCondLst>
+                              <p:cond delay="0"/>
+                            </p:stCondLst>
+                            <p:childTnLst>
+                              <p:par>
+                                <p:cTn id="5" presetID="10" presetClass="entr" presetSubtype="0" fill="hold" grpId="0" nodeType="clickEffect">
+                                  <p:stCondLst>
+                                    <p:cond delay="0"/>
+                                  </p:stCondLst>
+                                  <p:childTnLst>
+                                    <p:set>
+                                      <p:cBhvr>
+                                        <p:cTn id="6" dur="1" fill="hold">
+                                          <p:stCondLst>
+                                            <p:cond delay="0"/>
+                                          </p:stCondLst>
+                                        </p:cTn>
+                                        <p:tgtEl>
+                                          <p:spTgt spid="3">
+                                            <p:txEl>
+                                              <p:pRg st="0" end="0"/>
+                                            </p:txEl>
+                                          </p:spTgt>
+                                        </p:tgtEl>
+                                        <p:attrNameLst>
+                                          <p:attrName>style.visibility</p:attrName>
+                                        </p:attrNameLst>
+                                      </p:cBhvr>
+                                      <p:to>
+                                        <p:strVal val="visible"/>
+                                      </p:to>
+                                    </p:set>
+                                    <p:animEffect transition="in" filter="fade">
+                                      <p:cBhvr>
+                                        <p:cTn id="7" dur="500"/>
+                                        <p:tgtEl>
+                                          <p:spTgt spid="3">
+                                            <p:txEl>
+                                              <p:pRg st="0" end="0"/>
+                                            </p:txEl>
+                                          </p:spTgt>
+                                        </p:tgtEl>
+                                      </p:cBhvr>
+                                    </p:animEffect>
+                                  </p:childTnLst>
+                                </p:cTn>
+                              </p:par>
+                            </p:childTnLst>
+                          </p:cTn>
+                        </p:par>
+                      </p:childTnLst>
+                    </p:cTn>
+                  </p:par>
+                  <p:par>
+                    <p:cTn id="8" fill="hold">
+                      <p:stCondLst>
+                        <p:cond delay="indefinite"/>
+                      </p:stCondLst>
+                      <p:childTnLst>
+                        <p:par>
+                          <p:cTn id="9" fill="hold">
+                            <p:stCondLst>
+                              <p:cond delay="0"/>
+                            </p:stCondLst>
+                            <p:childTnLst>
+                              <p:par>
+                                <p:cTn id="10" presetID="10" presetClass="entr" presetSubtype="0" fill="hold" grpId="0" nodeType="clickEffect">
+                                  <p:stCondLst>
+                                    <p:cond delay="0"/>
+                                  </p:stCondLst>
+                                  <p:childTnLst>
+                                    <p:set>
+                                      <p:cBhvr>
+                                        <p:cTn id="11" dur="1" fill="hold">
+                                          <p:stCondLst>
+                                            <p:cond delay="0"/>
+                                          </p:stCondLst>
+                                        </p:cTn>
+                                        <p:tgtEl>
+                                          <p:spTgt spid="3">
+                                            <p:txEl>
+                                              <p:pRg st="2" end="2"/>
+                                            </p:txEl>
+                                          </p:spTgt>
+                                        </p:tgtEl>
+                                        <p:attrNameLst>
+                                          <p:attrName>style.visibility</p:attrName>
+                                        </p:attrNameLst>
+                                      </p:cBhvr>
+                                      <p:to>
+                                        <p:strVal val="visible"/>
+                                      </p:to>
+                                    </p:set>
+                                    <p:animEffect transition="in" filter="fade">
+                                      <p:cBhvr>
+                                        <p:cTn id="12" dur="500"/>
+                                        <p:tgtEl>
+                                          <p:spTgt spid="3">
+                                            <p:txEl>
+                                              <p:pRg st="2" end="2"/>
+                                            </p:txEl>
+                                          </p:spTgt>
+                                        </p:tgtEl>
+                                      </p:cBhvr>
+                                    </p:animEffect>
+                                  </p:childTnLst>
+                                </p:cTn>
+                              </p:par>
+                            </p:childTnLst>
+                          </p:cTn>
+                        </p:par>
+                      </p:childTnLst>
+                    </p:cTn>
+                  </p:par>
+                  <p:par>
+                    <p:cTn id="13" fill="hold">
+                      <p:stCondLst>
+                        <p:cond delay="indefinite"/>
+                      </p:stCondLst>
+                      <p:childTnLst>
+                        <p:par>
+                          <p:cTn id="14" fill="hold">
+                            <p:stCondLst>
+                              <p:cond delay="0"/>
+                            </p:stCondLst>
+                            <p:childTnLst>
+                              <p:par>
+                                <p:cTn id="15" presetID="10" presetClass="entr" presetSubtype="0" fill="hold" grpId="0" nodeType="clickEffect">
+                                  <p:stCondLst>
+                                    <p:cond delay="0"/>
+                                  </p:stCondLst>
+                                  <p:childTnLst>
+                                    <p:set>
+                                      <p:cBhvr>
+                                        <p:cTn id="16" dur="1" fill="hold">
+                                          <p:stCondLst>
+                                            <p:cond delay="0"/>
+                                          </p:stCondLst>
+                                        </p:cTn>
+                                        <p:tgtEl>
+                                          <p:spTgt spid="3">
+                                            <p:txEl>
+                                              <p:pRg st="4" end="4"/>
+                                            </p:txEl>
+                                          </p:spTgt>
+                                        </p:tgtEl>
+                                        <p:attrNameLst>
+                                          <p:attrName>style.visibility</p:attrName>
+                                        </p:attrNameLst>
+                                      </p:cBhvr>
+                                      <p:to>
+                                        <p:strVal val="visible"/>
+                                      </p:to>
+                                    </p:set>
+                                    <p:animEffect transition="in" filter="fade">
+                                      <p:cBhvr>
+                                        <p:cTn id="17" dur="500"/>
+                                        <p:tgtEl>
+                                          <p:spTgt spid="3">
+                                            <p:txEl>
+                                              <p:pRg st="4" end="4"/>
+                                            </p:txEl>
+                                          </p:spTgt>
+                                        </p:tgtEl>
+                                      </p:cBhvr>
+                                    </p:animEffect>
                                   </p:childTnLst>
                                 </p:cTn>
                               </p:par>
@@ -4078,4 +5061,319 @@
     </a:ext>
   </a:extLst>
 </a:theme>
+</file>
+
+<file path=ppt/theme/theme2.xml><?xml version="1.0" encoding="utf-8"?>
+<a:theme xmlns:a="http://schemas.openxmlformats.org/drawingml/2006/main" name="Office Theme">
+  <a:themeElements>
+    <a:clrScheme name="Office">
+      <a:dk1>
+        <a:sysClr val="windowText" lastClr="000000"/>
+      </a:dk1>
+      <a:lt1>
+        <a:sysClr val="window" lastClr="FFFFFF"/>
+      </a:lt1>
+      <a:dk2>
+        <a:srgbClr val="0E2841"/>
+      </a:dk2>
+      <a:lt2>
+        <a:srgbClr val="E8E8E8"/>
+      </a:lt2>
+      <a:accent1>
+        <a:srgbClr val="156082"/>
+      </a:accent1>
+      <a:accent2>
+        <a:srgbClr val="E97132"/>
+      </a:accent2>
+      <a:accent3>
+        <a:srgbClr val="196B24"/>
+      </a:accent3>
+      <a:accent4>
+        <a:srgbClr val="0F9ED5"/>
+      </a:accent4>
+      <a:accent5>
+        <a:srgbClr val="A02B93"/>
+      </a:accent5>
+      <a:accent6>
+        <a:srgbClr val="4EA72E"/>
+      </a:accent6>
+      <a:hlink>
+        <a:srgbClr val="467886"/>
+      </a:hlink>
+      <a:folHlink>
+        <a:srgbClr val="96607D"/>
+      </a:folHlink>
+    </a:clrScheme>
+    <a:fontScheme name="Office">
+      <a:majorFont>
+        <a:latin typeface="Aptos Display" panose="02110004020202020204"/>
+        <a:ea typeface=""/>
+        <a:cs typeface=""/>
+        <a:font script="Jpan" typeface="游ゴシック Light"/>
+        <a:font script="Hang" typeface="맑은 고딕"/>
+        <a:font script="Hans" typeface="等线 Light"/>
+        <a:font script="Hant" typeface="新細明體"/>
+        <a:font script="Arab" typeface="Times New Roman"/>
+        <a:font script="Hebr" typeface="Times New Roman"/>
+        <a:font script="Thai" typeface="Angsana New"/>
+        <a:font script="Ethi" typeface="Nyala"/>
+        <a:font script="Beng" typeface="Vrinda"/>
+        <a:font script="Gujr" typeface="Shruti"/>
+        <a:font script="Khmr" typeface="MoolBoran"/>
+        <a:font script="Knda" typeface="Tunga"/>
+        <a:font script="Guru" typeface="Raavi"/>
+        <a:font script="Cans" typeface="Euphemia"/>
+        <a:font script="Cher" typeface="Plantagenet Cherokee"/>
+        <a:font script="Yiii" typeface="Microsoft Yi Baiti"/>
+        <a:font script="Tibt" typeface="Microsoft Himalaya"/>
+        <a:font script="Thaa" typeface="MV Boli"/>
+        <a:font script="Deva" typeface="Mangal"/>
+        <a:font script="Telu" typeface="Gautami"/>
+        <a:font script="Taml" typeface="Latha"/>
+        <a:font script="Syrc" typeface="Estrangelo Edessa"/>
+        <a:font script="Orya" typeface="Kalinga"/>
+        <a:font script="Mlym" typeface="Kartika"/>
+        <a:font script="Laoo" typeface="DokChampa"/>
+        <a:font script="Sinh" typeface="Iskoola Pota"/>
+        <a:font script="Mong" typeface="Mongolian Baiti"/>
+        <a:font script="Viet" typeface="Times New Roman"/>
+        <a:font script="Uigh" typeface="Microsoft Uighur"/>
+        <a:font script="Geor" typeface="Sylfaen"/>
+        <a:font script="Armn" typeface="Arial"/>
+        <a:font script="Bugi" typeface="Leelawadee UI"/>
+        <a:font script="Bopo" typeface="Microsoft JhengHei"/>
+        <a:font script="Java" typeface="Javanese Text"/>
+        <a:font script="Lisu" typeface="Segoe UI"/>
+        <a:font script="Mymr" typeface="Myanmar Text"/>
+        <a:font script="Nkoo" typeface="Ebrima"/>
+        <a:font script="Olck" typeface="Nirmala UI"/>
+        <a:font script="Osma" typeface="Ebrima"/>
+        <a:font script="Phag" typeface="Phagspa"/>
+        <a:font script="Syrn" typeface="Estrangelo Edessa"/>
+        <a:font script="Syrj" typeface="Estrangelo Edessa"/>
+        <a:font script="Syre" typeface="Estrangelo Edessa"/>
+        <a:font script="Sora" typeface="Nirmala UI"/>
+        <a:font script="Tale" typeface="Microsoft Tai Le"/>
+        <a:font script="Talu" typeface="Microsoft New Tai Lue"/>
+        <a:font script="Tfng" typeface="Ebrima"/>
+      </a:majorFont>
+      <a:minorFont>
+        <a:latin typeface="Aptos" panose="02110004020202020204"/>
+        <a:ea typeface=""/>
+        <a:cs typeface=""/>
+        <a:font script="Jpan" typeface="游ゴシック"/>
+        <a:font script="Hang" typeface="맑은 고딕"/>
+        <a:font script="Hans" typeface="等线"/>
+        <a:font script="Hant" typeface="新細明體"/>
+        <a:font script="Arab" typeface="Arial"/>
+        <a:font script="Hebr" typeface="Arial"/>
+        <a:font script="Thai" typeface="Cordia New"/>
+        <a:font script="Ethi" typeface="Nyala"/>
+        <a:font script="Beng" typeface="Vrinda"/>
+        <a:font script="Gujr" typeface="Shruti"/>
+        <a:font script="Khmr" typeface="DaunPenh"/>
+        <a:font script="Knda" typeface="Tunga"/>
+        <a:font script="Guru" typeface="Raavi"/>
+        <a:font script="Cans" typeface="Euphemia"/>
+        <a:font script="Cher" typeface="Plantagenet Cherokee"/>
+        <a:font script="Yiii" typeface="Microsoft Yi Baiti"/>
+        <a:font script="Tibt" typeface="Microsoft Himalaya"/>
+        <a:font script="Thaa" typeface="MV Boli"/>
+        <a:font script="Deva" typeface="Mangal"/>
+        <a:font script="Telu" typeface="Gautami"/>
+        <a:font script="Taml" typeface="Latha"/>
+        <a:font script="Syrc" typeface="Estrangelo Edessa"/>
+        <a:font script="Orya" typeface="Kalinga"/>
+        <a:font script="Mlym" typeface="Kartika"/>
+        <a:font script="Laoo" typeface="DokChampa"/>
+        <a:font script="Sinh" typeface="Iskoola Pota"/>
+        <a:font script="Mong" typeface="Mongolian Baiti"/>
+        <a:font script="Viet" typeface="Arial"/>
+        <a:font script="Uigh" typeface="Microsoft Uighur"/>
+        <a:font script="Geor" typeface="Sylfaen"/>
+        <a:font script="Armn" typeface="Arial"/>
+        <a:font script="Bugi" typeface="Leelawadee UI"/>
+        <a:font script="Bopo" typeface="Microsoft JhengHei"/>
+        <a:font script="Java" typeface="Javanese Text"/>
+        <a:font script="Lisu" typeface="Segoe UI"/>
+        <a:font script="Mymr" typeface="Myanmar Text"/>
+        <a:font script="Nkoo" typeface="Ebrima"/>
+        <a:font script="Olck" typeface="Nirmala UI"/>
+        <a:font script="Osma" typeface="Ebrima"/>
+        <a:font script="Phag" typeface="Phagspa"/>
+        <a:font script="Syrn" typeface="Estrangelo Edessa"/>
+        <a:font script="Syrj" typeface="Estrangelo Edessa"/>
+        <a:font script="Syre" typeface="Estrangelo Edessa"/>
+        <a:font script="Sora" typeface="Nirmala UI"/>
+        <a:font script="Tale" typeface="Microsoft Tai Le"/>
+        <a:font script="Talu" typeface="Microsoft New Tai Lue"/>
+        <a:font script="Tfng" typeface="Ebrima"/>
+      </a:minorFont>
+    </a:fontScheme>
+    <a:fmtScheme name="Office">
+      <a:fillStyleLst>
+        <a:solidFill>
+          <a:schemeClr val="phClr"/>
+        </a:solidFill>
+        <a:gradFill rotWithShape="1">
+          <a:gsLst>
+            <a:gs pos="0">
+              <a:schemeClr val="phClr">
+                <a:lumMod val="110000"/>
+                <a:satMod val="105000"/>
+                <a:tint val="67000"/>
+              </a:schemeClr>
+            </a:gs>
+            <a:gs pos="50000">
+              <a:schemeClr val="phClr">
+                <a:lumMod val="105000"/>
+                <a:satMod val="103000"/>
+                <a:tint val="73000"/>
+              </a:schemeClr>
+            </a:gs>
+            <a:gs pos="100000">
+              <a:schemeClr val="phClr">
+                <a:lumMod val="105000"/>
+                <a:satMod val="109000"/>
+                <a:tint val="81000"/>
+              </a:schemeClr>
+            </a:gs>
+          </a:gsLst>
+          <a:lin ang="5400000" scaled="0"/>
+        </a:gradFill>
+        <a:gradFill rotWithShape="1">
+          <a:gsLst>
+            <a:gs pos="0">
+              <a:schemeClr val="phClr">
+                <a:satMod val="103000"/>
+                <a:lumMod val="102000"/>
+                <a:tint val="94000"/>
+              </a:schemeClr>
+            </a:gs>
+            <a:gs pos="50000">
+              <a:schemeClr val="phClr">
+                <a:satMod val="110000"/>
+                <a:lumMod val="100000"/>
+                <a:shade val="100000"/>
+              </a:schemeClr>
+            </a:gs>
+            <a:gs pos="100000">
+              <a:schemeClr val="phClr">
+                <a:lumMod val="99000"/>
+                <a:satMod val="120000"/>
+                <a:shade val="78000"/>
+              </a:schemeClr>
+            </a:gs>
+          </a:gsLst>
+          <a:lin ang="5400000" scaled="0"/>
+        </a:gradFill>
+      </a:fillStyleLst>
+      <a:lnStyleLst>
+        <a:ln w="12700" cap="flat" cmpd="sng" algn="ctr">
+          <a:solidFill>
+            <a:schemeClr val="phClr"/>
+          </a:solidFill>
+          <a:prstDash val="solid"/>
+          <a:miter lim="800000"/>
+        </a:ln>
+        <a:ln w="19050" cap="flat" cmpd="sng" algn="ctr">
+          <a:solidFill>
+            <a:schemeClr val="phClr"/>
+          </a:solidFill>
+          <a:prstDash val="solid"/>
+          <a:miter lim="800000"/>
+        </a:ln>
+        <a:ln w="25400" cap="flat" cmpd="sng" algn="ctr">
+          <a:solidFill>
+            <a:schemeClr val="phClr"/>
+          </a:solidFill>
+          <a:prstDash val="solid"/>
+          <a:miter lim="800000"/>
+        </a:ln>
+      </a:lnStyleLst>
+      <a:effectStyleLst>
+        <a:effectStyle>
+          <a:effectLst/>
+        </a:effectStyle>
+        <a:effectStyle>
+          <a:effectLst/>
+        </a:effectStyle>
+        <a:effectStyle>
+          <a:effectLst>
+            <a:outerShdw blurRad="57150" dist="19050" dir="5400000" algn="ctr" rotWithShape="0">
+              <a:srgbClr val="000000">
+                <a:alpha val="63000"/>
+              </a:srgbClr>
+            </a:outerShdw>
+          </a:effectLst>
+        </a:effectStyle>
+      </a:effectStyleLst>
+      <a:bgFillStyleLst>
+        <a:solidFill>
+          <a:schemeClr val="phClr"/>
+        </a:solidFill>
+        <a:solidFill>
+          <a:schemeClr val="phClr">
+            <a:tint val="95000"/>
+            <a:satMod val="170000"/>
+          </a:schemeClr>
+        </a:solidFill>
+        <a:gradFill rotWithShape="1">
+          <a:gsLst>
+            <a:gs pos="0">
+              <a:schemeClr val="phClr">
+                <a:tint val="93000"/>
+                <a:satMod val="150000"/>
+                <a:shade val="98000"/>
+                <a:lumMod val="102000"/>
+              </a:schemeClr>
+            </a:gs>
+            <a:gs pos="50000">
+              <a:schemeClr val="phClr">
+                <a:tint val="98000"/>
+                <a:satMod val="130000"/>
+                <a:shade val="90000"/>
+                <a:lumMod val="103000"/>
+              </a:schemeClr>
+            </a:gs>
+            <a:gs pos="100000">
+              <a:schemeClr val="phClr">
+                <a:shade val="63000"/>
+                <a:satMod val="120000"/>
+              </a:schemeClr>
+            </a:gs>
+          </a:gsLst>
+          <a:lin ang="5400000" scaled="0"/>
+        </a:gradFill>
+      </a:bgFillStyleLst>
+    </a:fmtScheme>
+  </a:themeElements>
+  <a:objectDefaults>
+    <a:lnDef>
+      <a:spPr/>
+      <a:bodyPr/>
+      <a:lstStyle/>
+      <a:style>
+        <a:lnRef idx="2">
+          <a:schemeClr val="accent1"/>
+        </a:lnRef>
+        <a:fillRef idx="0">
+          <a:schemeClr val="accent1"/>
+        </a:fillRef>
+        <a:effectRef idx="1">
+          <a:schemeClr val="accent1"/>
+        </a:effectRef>
+        <a:fontRef idx="minor">
+          <a:schemeClr val="tx1"/>
+        </a:fontRef>
+      </a:style>
+    </a:lnDef>
+  </a:objectDefaults>
+  <a:extraClrSchemeLst/>
+  <a:extLst>
+    <a:ext uri="{05A4C25C-085E-4340-85A3-A5531E510DB2}">
+      <thm15:themeFamily xmlns:thm15="http://schemas.microsoft.com/office/thememl/2012/main" name="Office Theme" id="{2E142A2C-CD16-42D6-873A-C26D2A0506FA}" vid="{1BDDFF52-6CD6-40A5-AB3C-68EB2F1E4D0A}"/>
+    </a:ext>
+  </a:extLst>
+</a:theme>
 </file>
</xml_diff>